<commit_message>
add time series notebook
</commit_message>
<xml_diff>
--- a/MiCM_StatsPythonF21_AAyad.pptx
+++ b/MiCM_StatsPythonF21_AAyad.pptx
@@ -12075,116 +12075,17 @@
         </p:spPr>
         <p:txBody>
           <a:bodyPr>
-            <a:normAutofit fontScale="85000" lnSpcReduction="20000"/>
+            <a:normAutofit/>
           </a:bodyPr>
           <a:lstStyle/>
           <a:p>
             <a:r>
-              <a:rPr lang="en-CA" sz="2300" dirty="0">
+              <a:rPr lang="en-CA" dirty="0">
                 <a:hlinkClick r:id="rId2"/>
               </a:rPr>
-              <a:t>http://cs231n.stanford.edu/</a:t>
+              <a:t>https://github.com/john-science/python-bootcamp</a:t>
             </a:r>
-            <a:endParaRPr lang="en-CA" sz="2300" dirty="0"/>
-          </a:p>
-          <a:p>
-            <a:r>
-              <a:rPr lang="en-CA" sz="2300" dirty="0">
-                <a:hlinkClick r:id="rId3"/>
-              </a:rPr>
-              <a:t>https://www.siamak.page/courses/COMP551F20/index.html</a:t>
-            </a:r>
-            <a:endParaRPr lang="en-CA" sz="2300" dirty="0"/>
-          </a:p>
-          <a:p>
-            <a:r>
-              <a:rPr lang="en-CA" sz="2300" dirty="0">
-                <a:hlinkClick r:id="rId4"/>
-              </a:rPr>
-              <a:t>https://homes.cs.washington.edu/~pedrod/papers/cacm12.pdf</a:t>
-            </a:r>
-            <a:endParaRPr lang="en-CA" sz="2300" dirty="0"/>
-          </a:p>
-          <a:p>
-            <a:r>
-              <a:rPr lang="en-CA" sz="2300" dirty="0">
-                <a:hlinkClick r:id="rId3"/>
-              </a:rPr>
-              <a:t>https://www.siamak.page/courses/COMP551F20/index.html</a:t>
-            </a:r>
-            <a:endParaRPr lang="en-CA" sz="2300" dirty="0"/>
-          </a:p>
-          <a:p>
-            <a:r>
-              <a:rPr lang="en-CA" sz="2300" dirty="0">
-                <a:hlinkClick r:id="rId5"/>
-              </a:rPr>
-              <a:t>http://d2l.ai/index.html</a:t>
-            </a:r>
-            <a:endParaRPr lang="en-CA" sz="2300" dirty="0"/>
-          </a:p>
-          <a:p>
-            <a:r>
-              <a:rPr lang="en-CA" sz="2300" dirty="0">
-                <a:hlinkClick r:id="rId6"/>
-              </a:rPr>
-              <a:t>https://software.intel.com/content/www/us/en/develop/training/course-time-series-analysis.html</a:t>
-            </a:r>
-            <a:endParaRPr lang="en-CA" sz="2300" dirty="0"/>
-          </a:p>
-          <a:p>
-            <a:r>
-              <a:rPr lang="en-CA" sz="2300" dirty="0">
-                <a:hlinkClick r:id="rId7"/>
-              </a:rPr>
-              <a:t>http://cs109.github.io/2015/pages/videos.html</a:t>
-            </a:r>
-            <a:endParaRPr lang="en-CA" sz="2300" dirty="0"/>
-          </a:p>
-          <a:p>
-            <a:r>
-              <a:rPr lang="en-CA" sz="2300" dirty="0">
-                <a:hlinkClick r:id="rId8"/>
-              </a:rPr>
-              <a:t>https://www.ibm.com/cloud/machine-learning</a:t>
-            </a:r>
-            <a:endParaRPr lang="en-CA" sz="2300" dirty="0"/>
-          </a:p>
-          <a:p>
-            <a:r>
-              <a:rPr lang="en-CA" sz="2300" dirty="0">
-                <a:hlinkClick r:id="rId9"/>
-              </a:rPr>
-              <a:t>The Elements of Statistical Learning</a:t>
-            </a:r>
-            <a:endParaRPr lang="en-CA" sz="2300" dirty="0"/>
-          </a:p>
-          <a:p>
-            <a:r>
-              <a:rPr lang="en-CA" sz="2300" dirty="0">
-                <a:hlinkClick r:id="rId10"/>
-              </a:rPr>
-              <a:t>Information Theory, Inference, and Learning Algorithms</a:t>
-            </a:r>
-            <a:endParaRPr lang="en-CA" sz="2300" dirty="0"/>
-          </a:p>
-          <a:p>
-            <a:r>
-              <a:rPr lang="en-CA" sz="2300" dirty="0">
-                <a:hlinkClick r:id="rId11"/>
-              </a:rPr>
-              <a:t>Understanding Machine Learning: From Theory to Algorithms</a:t>
-            </a:r>
-            <a:endParaRPr lang="en-CA" sz="2300" dirty="0"/>
-          </a:p>
-          <a:p>
-            <a:r>
-              <a:rPr lang="en-CA" sz="2300" dirty="0">
-                <a:hlinkClick r:id="rId12"/>
-              </a:rPr>
-              <a:t>Dive into Deep Learning</a:t>
-            </a:r>
-            <a:endParaRPr lang="en-CA" sz="2300" dirty="0"/>
+            <a:endParaRPr lang="en-CA" dirty="0"/>
           </a:p>
           <a:p>
             <a:endParaRPr lang="en-CA" dirty="0"/>

</xml_diff>

<commit_message>
add time series data and update readme
</commit_message>
<xml_diff>
--- a/MiCM_StatsPythonF21_AAyad.pptx
+++ b/MiCM_StatsPythonF21_AAyad.pptx
@@ -5,7 +5,7 @@
     <p:sldMasterId id="2147483660" r:id="rId1"/>
   </p:sldMasterIdLst>
   <p:notesMasterIdLst>
-    <p:notesMasterId r:id="rId26"/>
+    <p:notesMasterId r:id="rId28"/>
   </p:notesMasterIdLst>
   <p:sldIdLst>
     <p:sldId id="263" r:id="rId2"/>
@@ -21,17 +21,19 @@
     <p:sldId id="442" r:id="rId12"/>
     <p:sldId id="444" r:id="rId13"/>
     <p:sldId id="443" r:id="rId14"/>
-    <p:sldId id="441" r:id="rId15"/>
-    <p:sldId id="359" r:id="rId16"/>
-    <p:sldId id="381" r:id="rId17"/>
-    <p:sldId id="384" r:id="rId18"/>
-    <p:sldId id="382" r:id="rId19"/>
-    <p:sldId id="388" r:id="rId20"/>
-    <p:sldId id="397" r:id="rId21"/>
-    <p:sldId id="338" r:id="rId22"/>
-    <p:sldId id="339" r:id="rId23"/>
-    <p:sldId id="400" r:id="rId24"/>
-    <p:sldId id="401" r:id="rId25"/>
+    <p:sldId id="446" r:id="rId15"/>
+    <p:sldId id="447" r:id="rId16"/>
+    <p:sldId id="441" r:id="rId17"/>
+    <p:sldId id="359" r:id="rId18"/>
+    <p:sldId id="381" r:id="rId19"/>
+    <p:sldId id="384" r:id="rId20"/>
+    <p:sldId id="382" r:id="rId21"/>
+    <p:sldId id="388" r:id="rId22"/>
+    <p:sldId id="397" r:id="rId23"/>
+    <p:sldId id="338" r:id="rId24"/>
+    <p:sldId id="339" r:id="rId25"/>
+    <p:sldId id="400" r:id="rId26"/>
+    <p:sldId id="401" r:id="rId27"/>
   </p:sldIdLst>
   <p:sldSz cx="9144000" cy="6858000" type="screen4x3"/>
   <p:notesSz cx="6858000" cy="9144000"/>
@@ -148,6 +150,8 @@
             <p14:sldId id="442"/>
             <p14:sldId id="444"/>
             <p14:sldId id="443"/>
+            <p14:sldId id="446"/>
+            <p14:sldId id="447"/>
             <p14:sldId id="441"/>
             <p14:sldId id="359"/>
             <p14:sldId id="381"/>
@@ -8104,6 +8108,753 @@
       </p:grpSpPr>
       <p:sp>
         <p:nvSpPr>
+          <p:cNvPr id="2" name="Titre 1">
+            <a:extLst>
+              <a:ext uri="{FF2B5EF4-FFF2-40B4-BE49-F238E27FC236}">
+                <a16:creationId xmlns:a16="http://schemas.microsoft.com/office/drawing/2014/main" id="{7D442A67-6808-B148-B650-0C3896F6C6CD}"/>
+              </a:ext>
+            </a:extLst>
+          </p:cNvPr>
+          <p:cNvSpPr>
+            <a:spLocks noGrp="1"/>
+          </p:cNvSpPr>
+          <p:nvPr>
+            <p:ph type="title"/>
+          </p:nvPr>
+        </p:nvSpPr>
+        <p:spPr>
+          <a:xfrm>
+            <a:off x="-36512" y="404664"/>
+            <a:ext cx="9289032" cy="979999"/>
+          </a:xfrm>
+          <a:solidFill>
+            <a:schemeClr val="accent2"/>
+          </a:solidFill>
+        </p:spPr>
+        <p:txBody>
+          <a:bodyPr>
+            <a:normAutofit/>
+          </a:bodyPr>
+          <a:lstStyle/>
+          <a:p>
+            <a:r>
+              <a:rPr lang="en-CA" sz="4000" b="1" dirty="0">
+                <a:latin typeface="Helvetica" pitchFamily="2" charset="0"/>
+              </a:rPr>
+              <a:t>Python 101</a:t>
+            </a:r>
+          </a:p>
+        </p:txBody>
+      </p:sp>
+      <p:sp>
+        <p:nvSpPr>
+          <p:cNvPr id="5" name="Espace réservé du contenu 2">
+            <a:extLst>
+              <a:ext uri="{FF2B5EF4-FFF2-40B4-BE49-F238E27FC236}">
+                <a16:creationId xmlns:a16="http://schemas.microsoft.com/office/drawing/2014/main" id="{A3115C2C-E99E-484B-8576-07ADAD22D341}"/>
+              </a:ext>
+            </a:extLst>
+          </p:cNvPr>
+          <p:cNvSpPr txBox="1">
+            <a:spLocks/>
+          </p:cNvSpPr>
+          <p:nvPr/>
+        </p:nvSpPr>
+        <p:spPr>
+          <a:xfrm>
+            <a:off x="4427984" y="1825625"/>
+            <a:ext cx="4519414" cy="1818065"/>
+          </a:xfrm>
+          <a:prstGeom prst="rect">
+            <a:avLst/>
+          </a:prstGeom>
+        </p:spPr>
+        <p:txBody>
+          <a:bodyPr vert="horz" lIns="91440" tIns="45720" rIns="91440" bIns="45720" rtlCol="0">
+            <a:normAutofit/>
+          </a:bodyPr>
+          <a:lstStyle>
+            <a:lvl1pPr marL="228600" indent="-228600" algn="l" defTabSz="914400" rtl="0" eaLnBrk="1" latinLnBrk="0" hangingPunct="1">
+              <a:lnSpc>
+                <a:spcPct val="90000"/>
+              </a:lnSpc>
+              <a:spcBef>
+                <a:spcPts val="1000"/>
+              </a:spcBef>
+              <a:buFont typeface="Arial" panose="020B0604020202020204" pitchFamily="34" charset="0"/>
+              <a:buChar char="•"/>
+              <a:defRPr sz="2800" kern="1200">
+                <a:solidFill>
+                  <a:schemeClr val="tx1"/>
+                </a:solidFill>
+                <a:latin typeface="+mn-lt"/>
+                <a:ea typeface="+mn-ea"/>
+                <a:cs typeface="+mn-cs"/>
+              </a:defRPr>
+            </a:lvl1pPr>
+            <a:lvl2pPr marL="685800" indent="-228600" algn="l" defTabSz="914400" rtl="0" eaLnBrk="1" latinLnBrk="0" hangingPunct="1">
+              <a:lnSpc>
+                <a:spcPct val="90000"/>
+              </a:lnSpc>
+              <a:spcBef>
+                <a:spcPts val="500"/>
+              </a:spcBef>
+              <a:buFont typeface="Arial" panose="020B0604020202020204" pitchFamily="34" charset="0"/>
+              <a:buChar char="•"/>
+              <a:defRPr sz="2400" kern="1200">
+                <a:solidFill>
+                  <a:schemeClr val="tx1"/>
+                </a:solidFill>
+                <a:latin typeface="+mn-lt"/>
+                <a:ea typeface="+mn-ea"/>
+                <a:cs typeface="+mn-cs"/>
+              </a:defRPr>
+            </a:lvl2pPr>
+            <a:lvl3pPr marL="1143000" indent="-228600" algn="l" defTabSz="914400" rtl="0" eaLnBrk="1" latinLnBrk="0" hangingPunct="1">
+              <a:lnSpc>
+                <a:spcPct val="90000"/>
+              </a:lnSpc>
+              <a:spcBef>
+                <a:spcPts val="500"/>
+              </a:spcBef>
+              <a:buFont typeface="Arial" panose="020B0604020202020204" pitchFamily="34" charset="0"/>
+              <a:buChar char="•"/>
+              <a:defRPr sz="2000" kern="1200">
+                <a:solidFill>
+                  <a:schemeClr val="tx1"/>
+                </a:solidFill>
+                <a:latin typeface="+mn-lt"/>
+                <a:ea typeface="+mn-ea"/>
+                <a:cs typeface="+mn-cs"/>
+              </a:defRPr>
+            </a:lvl3pPr>
+            <a:lvl4pPr marL="1600200" indent="-228600" algn="l" defTabSz="914400" rtl="0" eaLnBrk="1" latinLnBrk="0" hangingPunct="1">
+              <a:lnSpc>
+                <a:spcPct val="90000"/>
+              </a:lnSpc>
+              <a:spcBef>
+                <a:spcPts val="500"/>
+              </a:spcBef>
+              <a:buFont typeface="Arial" panose="020B0604020202020204" pitchFamily="34" charset="0"/>
+              <a:buChar char="•"/>
+              <a:defRPr sz="1800" kern="1200">
+                <a:solidFill>
+                  <a:schemeClr val="tx1"/>
+                </a:solidFill>
+                <a:latin typeface="+mn-lt"/>
+                <a:ea typeface="+mn-ea"/>
+                <a:cs typeface="+mn-cs"/>
+              </a:defRPr>
+            </a:lvl4pPr>
+            <a:lvl5pPr marL="2057400" indent="-228600" algn="l" defTabSz="914400" rtl="0" eaLnBrk="1" latinLnBrk="0" hangingPunct="1">
+              <a:lnSpc>
+                <a:spcPct val="90000"/>
+              </a:lnSpc>
+              <a:spcBef>
+                <a:spcPts val="500"/>
+              </a:spcBef>
+              <a:buFont typeface="Arial" panose="020B0604020202020204" pitchFamily="34" charset="0"/>
+              <a:buChar char="•"/>
+              <a:defRPr sz="1800" kern="1200">
+                <a:solidFill>
+                  <a:schemeClr val="tx1"/>
+                </a:solidFill>
+                <a:latin typeface="+mn-lt"/>
+                <a:ea typeface="+mn-ea"/>
+                <a:cs typeface="+mn-cs"/>
+              </a:defRPr>
+            </a:lvl5pPr>
+            <a:lvl6pPr marL="2514600" indent="-228600" algn="l" defTabSz="914400" rtl="0" eaLnBrk="1" latinLnBrk="0" hangingPunct="1">
+              <a:lnSpc>
+                <a:spcPct val="90000"/>
+              </a:lnSpc>
+              <a:spcBef>
+                <a:spcPts val="500"/>
+              </a:spcBef>
+              <a:buFont typeface="Arial" panose="020B0604020202020204" pitchFamily="34" charset="0"/>
+              <a:buChar char="•"/>
+              <a:defRPr sz="1800" kern="1200">
+                <a:solidFill>
+                  <a:schemeClr val="tx1"/>
+                </a:solidFill>
+                <a:latin typeface="+mn-lt"/>
+                <a:ea typeface="+mn-ea"/>
+                <a:cs typeface="+mn-cs"/>
+              </a:defRPr>
+            </a:lvl6pPr>
+            <a:lvl7pPr marL="2971800" indent="-228600" algn="l" defTabSz="914400" rtl="0" eaLnBrk="1" latinLnBrk="0" hangingPunct="1">
+              <a:lnSpc>
+                <a:spcPct val="90000"/>
+              </a:lnSpc>
+              <a:spcBef>
+                <a:spcPts val="500"/>
+              </a:spcBef>
+              <a:buFont typeface="Arial" panose="020B0604020202020204" pitchFamily="34" charset="0"/>
+              <a:buChar char="•"/>
+              <a:defRPr sz="1800" kern="1200">
+                <a:solidFill>
+                  <a:schemeClr val="tx1"/>
+                </a:solidFill>
+                <a:latin typeface="+mn-lt"/>
+                <a:ea typeface="+mn-ea"/>
+                <a:cs typeface="+mn-cs"/>
+              </a:defRPr>
+            </a:lvl7pPr>
+            <a:lvl8pPr marL="3429000" indent="-228600" algn="l" defTabSz="914400" rtl="0" eaLnBrk="1" latinLnBrk="0" hangingPunct="1">
+              <a:lnSpc>
+                <a:spcPct val="90000"/>
+              </a:lnSpc>
+              <a:spcBef>
+                <a:spcPts val="500"/>
+              </a:spcBef>
+              <a:buFont typeface="Arial" panose="020B0604020202020204" pitchFamily="34" charset="0"/>
+              <a:buChar char="•"/>
+              <a:defRPr sz="1800" kern="1200">
+                <a:solidFill>
+                  <a:schemeClr val="tx1"/>
+                </a:solidFill>
+                <a:latin typeface="+mn-lt"/>
+                <a:ea typeface="+mn-ea"/>
+                <a:cs typeface="+mn-cs"/>
+              </a:defRPr>
+            </a:lvl8pPr>
+            <a:lvl9pPr marL="3886200" indent="-228600" algn="l" defTabSz="914400" rtl="0" eaLnBrk="1" latinLnBrk="0" hangingPunct="1">
+              <a:lnSpc>
+                <a:spcPct val="90000"/>
+              </a:lnSpc>
+              <a:spcBef>
+                <a:spcPts val="500"/>
+              </a:spcBef>
+              <a:buFont typeface="Arial" panose="020B0604020202020204" pitchFamily="34" charset="0"/>
+              <a:buChar char="•"/>
+              <a:defRPr sz="1800" kern="1200">
+                <a:solidFill>
+                  <a:schemeClr val="tx1"/>
+                </a:solidFill>
+                <a:latin typeface="+mn-lt"/>
+                <a:ea typeface="+mn-ea"/>
+                <a:cs typeface="+mn-cs"/>
+              </a:defRPr>
+            </a:lvl9pPr>
+          </a:lstStyle>
+          <a:p>
+            <a:pPr>
+              <a:lnSpc>
+                <a:spcPct val="100000"/>
+              </a:lnSpc>
+            </a:pPr>
+            <a:endParaRPr lang="en-US" sz="1000" dirty="0">
+              <a:latin typeface="Helvetica" pitchFamily="2" charset="0"/>
+              <a:cs typeface="Calibri"/>
+            </a:endParaRPr>
+          </a:p>
+        </p:txBody>
+      </p:sp>
+      <p:sp>
+        <p:nvSpPr>
+          <p:cNvPr id="8" name="Content Placeholder 7">
+            <a:extLst>
+              <a:ext uri="{FF2B5EF4-FFF2-40B4-BE49-F238E27FC236}">
+                <a16:creationId xmlns:a16="http://schemas.microsoft.com/office/drawing/2014/main" id="{AC583E2D-9E5D-AF4E-8A3C-43004D01DFBC}"/>
+              </a:ext>
+            </a:extLst>
+          </p:cNvPr>
+          <p:cNvSpPr>
+            <a:spLocks noGrp="1"/>
+          </p:cNvSpPr>
+          <p:nvPr>
+            <p:ph sz="half" idx="1"/>
+          </p:nvPr>
+        </p:nvSpPr>
+        <p:spPr>
+          <a:xfrm>
+            <a:off x="323528" y="2101998"/>
+            <a:ext cx="7759774" cy="4351338"/>
+          </a:xfrm>
+        </p:spPr>
+        <p:txBody>
+          <a:bodyPr>
+            <a:normAutofit/>
+          </a:bodyPr>
+          <a:lstStyle/>
+          <a:p>
+            <a:pPr>
+              <a:lnSpc>
+                <a:spcPct val="150000"/>
+              </a:lnSpc>
+            </a:pPr>
+            <a:r>
+              <a:rPr lang="en-CA" sz="2200" b="1" dirty="0"/>
+              <a:t>Some of the topics covered today</a:t>
+            </a:r>
+          </a:p>
+          <a:p>
+            <a:pPr marL="457200" indent="-457200">
+              <a:lnSpc>
+                <a:spcPct val="150000"/>
+              </a:lnSpc>
+              <a:buFont typeface="+mj-lt"/>
+              <a:buAutoNum type="arabicPeriod"/>
+            </a:pPr>
+            <a:r>
+              <a:rPr lang="en-CA" sz="2200" b="1" dirty="0"/>
+              <a:t>Intro to Python</a:t>
+            </a:r>
+          </a:p>
+          <a:p>
+            <a:pPr marL="457200" indent="-457200">
+              <a:lnSpc>
+                <a:spcPct val="150000"/>
+              </a:lnSpc>
+              <a:buFont typeface="+mj-lt"/>
+              <a:buAutoNum type="arabicPeriod"/>
+            </a:pPr>
+            <a:r>
+              <a:rPr lang="en-CA" sz="2200" b="1" dirty="0"/>
+              <a:t>Data analysis with Pandas</a:t>
+            </a:r>
+          </a:p>
+          <a:p>
+            <a:pPr marL="457200" indent="-457200">
+              <a:lnSpc>
+                <a:spcPct val="150000"/>
+              </a:lnSpc>
+              <a:buFont typeface="+mj-lt"/>
+              <a:buAutoNum type="arabicPeriod"/>
+            </a:pPr>
+            <a:r>
+              <a:rPr lang="en-CA" sz="2200" b="1" dirty="0"/>
+              <a:t>Time series analysis</a:t>
+            </a:r>
+          </a:p>
+          <a:p>
+            <a:pPr marL="0" indent="0">
+              <a:lnSpc>
+                <a:spcPct val="150000"/>
+              </a:lnSpc>
+              <a:buNone/>
+            </a:pPr>
+            <a:endParaRPr lang="en-CA" sz="2200" b="1" dirty="0"/>
+          </a:p>
+          <a:p>
+            <a:endParaRPr lang="en-CA" b="1" dirty="0"/>
+          </a:p>
+        </p:txBody>
+      </p:sp>
+    </p:spTree>
+    <p:extLst>
+      <p:ext uri="{BB962C8B-B14F-4D97-AF65-F5344CB8AC3E}">
+        <p14:creationId xmlns:p14="http://schemas.microsoft.com/office/powerpoint/2010/main" val="3625614536"/>
+      </p:ext>
+    </p:extLst>
+  </p:cSld>
+  <p:clrMapOvr>
+    <a:masterClrMapping/>
+  </p:clrMapOvr>
+</p:sld>
+</file>
+
+<file path=ppt/slides/slide15.xml><?xml version="1.0" encoding="utf-8"?>
+<p:sld xmlns:a="http://schemas.openxmlformats.org/drawingml/2006/main" xmlns:r="http://schemas.openxmlformats.org/officeDocument/2006/relationships" xmlns:p="http://schemas.openxmlformats.org/presentationml/2006/main">
+  <p:cSld>
+    <p:spTree>
+      <p:nvGrpSpPr>
+        <p:cNvPr id="1" name=""/>
+        <p:cNvGrpSpPr/>
+        <p:nvPr/>
+      </p:nvGrpSpPr>
+      <p:grpSpPr>
+        <a:xfrm>
+          <a:off x="0" y="0"/>
+          <a:ext cx="0" cy="0"/>
+          <a:chOff x="0" y="0"/>
+          <a:chExt cx="0" cy="0"/>
+        </a:xfrm>
+      </p:grpSpPr>
+      <p:sp>
+        <p:nvSpPr>
+          <p:cNvPr id="2" name="Titre 1">
+            <a:extLst>
+              <a:ext uri="{FF2B5EF4-FFF2-40B4-BE49-F238E27FC236}">
+                <a16:creationId xmlns:a16="http://schemas.microsoft.com/office/drawing/2014/main" id="{7D442A67-6808-B148-B650-0C3896F6C6CD}"/>
+              </a:ext>
+            </a:extLst>
+          </p:cNvPr>
+          <p:cNvSpPr>
+            <a:spLocks noGrp="1"/>
+          </p:cNvSpPr>
+          <p:nvPr>
+            <p:ph type="title"/>
+          </p:nvPr>
+        </p:nvSpPr>
+        <p:spPr>
+          <a:xfrm>
+            <a:off x="-36512" y="404664"/>
+            <a:ext cx="9289032" cy="979999"/>
+          </a:xfrm>
+          <a:solidFill>
+            <a:schemeClr val="accent2"/>
+          </a:solidFill>
+        </p:spPr>
+        <p:txBody>
+          <a:bodyPr>
+            <a:normAutofit/>
+          </a:bodyPr>
+          <a:lstStyle/>
+          <a:p>
+            <a:r>
+              <a:rPr lang="en-CA" sz="4000" b="1" dirty="0">
+                <a:latin typeface="Helvetica" pitchFamily="2" charset="0"/>
+              </a:rPr>
+              <a:t>Python 101</a:t>
+            </a:r>
+          </a:p>
+        </p:txBody>
+      </p:sp>
+      <p:sp>
+        <p:nvSpPr>
+          <p:cNvPr id="5" name="Espace réservé du contenu 2">
+            <a:extLst>
+              <a:ext uri="{FF2B5EF4-FFF2-40B4-BE49-F238E27FC236}">
+                <a16:creationId xmlns:a16="http://schemas.microsoft.com/office/drawing/2014/main" id="{A3115C2C-E99E-484B-8576-07ADAD22D341}"/>
+              </a:ext>
+            </a:extLst>
+          </p:cNvPr>
+          <p:cNvSpPr txBox="1">
+            <a:spLocks/>
+          </p:cNvSpPr>
+          <p:nvPr/>
+        </p:nvSpPr>
+        <p:spPr>
+          <a:xfrm>
+            <a:off x="4427984" y="1825625"/>
+            <a:ext cx="4519414" cy="1818065"/>
+          </a:xfrm>
+          <a:prstGeom prst="rect">
+            <a:avLst/>
+          </a:prstGeom>
+        </p:spPr>
+        <p:txBody>
+          <a:bodyPr vert="horz" lIns="91440" tIns="45720" rIns="91440" bIns="45720" rtlCol="0">
+            <a:normAutofit/>
+          </a:bodyPr>
+          <a:lstStyle>
+            <a:lvl1pPr marL="228600" indent="-228600" algn="l" defTabSz="914400" rtl="0" eaLnBrk="1" latinLnBrk="0" hangingPunct="1">
+              <a:lnSpc>
+                <a:spcPct val="90000"/>
+              </a:lnSpc>
+              <a:spcBef>
+                <a:spcPts val="1000"/>
+              </a:spcBef>
+              <a:buFont typeface="Arial" panose="020B0604020202020204" pitchFamily="34" charset="0"/>
+              <a:buChar char="•"/>
+              <a:defRPr sz="2800" kern="1200">
+                <a:solidFill>
+                  <a:schemeClr val="tx1"/>
+                </a:solidFill>
+                <a:latin typeface="+mn-lt"/>
+                <a:ea typeface="+mn-ea"/>
+                <a:cs typeface="+mn-cs"/>
+              </a:defRPr>
+            </a:lvl1pPr>
+            <a:lvl2pPr marL="685800" indent="-228600" algn="l" defTabSz="914400" rtl="0" eaLnBrk="1" latinLnBrk="0" hangingPunct="1">
+              <a:lnSpc>
+                <a:spcPct val="90000"/>
+              </a:lnSpc>
+              <a:spcBef>
+                <a:spcPts val="500"/>
+              </a:spcBef>
+              <a:buFont typeface="Arial" panose="020B0604020202020204" pitchFamily="34" charset="0"/>
+              <a:buChar char="•"/>
+              <a:defRPr sz="2400" kern="1200">
+                <a:solidFill>
+                  <a:schemeClr val="tx1"/>
+                </a:solidFill>
+                <a:latin typeface="+mn-lt"/>
+                <a:ea typeface="+mn-ea"/>
+                <a:cs typeface="+mn-cs"/>
+              </a:defRPr>
+            </a:lvl2pPr>
+            <a:lvl3pPr marL="1143000" indent="-228600" algn="l" defTabSz="914400" rtl="0" eaLnBrk="1" latinLnBrk="0" hangingPunct="1">
+              <a:lnSpc>
+                <a:spcPct val="90000"/>
+              </a:lnSpc>
+              <a:spcBef>
+                <a:spcPts val="500"/>
+              </a:spcBef>
+              <a:buFont typeface="Arial" panose="020B0604020202020204" pitchFamily="34" charset="0"/>
+              <a:buChar char="•"/>
+              <a:defRPr sz="2000" kern="1200">
+                <a:solidFill>
+                  <a:schemeClr val="tx1"/>
+                </a:solidFill>
+                <a:latin typeface="+mn-lt"/>
+                <a:ea typeface="+mn-ea"/>
+                <a:cs typeface="+mn-cs"/>
+              </a:defRPr>
+            </a:lvl3pPr>
+            <a:lvl4pPr marL="1600200" indent="-228600" algn="l" defTabSz="914400" rtl="0" eaLnBrk="1" latinLnBrk="0" hangingPunct="1">
+              <a:lnSpc>
+                <a:spcPct val="90000"/>
+              </a:lnSpc>
+              <a:spcBef>
+                <a:spcPts val="500"/>
+              </a:spcBef>
+              <a:buFont typeface="Arial" panose="020B0604020202020204" pitchFamily="34" charset="0"/>
+              <a:buChar char="•"/>
+              <a:defRPr sz="1800" kern="1200">
+                <a:solidFill>
+                  <a:schemeClr val="tx1"/>
+                </a:solidFill>
+                <a:latin typeface="+mn-lt"/>
+                <a:ea typeface="+mn-ea"/>
+                <a:cs typeface="+mn-cs"/>
+              </a:defRPr>
+            </a:lvl4pPr>
+            <a:lvl5pPr marL="2057400" indent="-228600" algn="l" defTabSz="914400" rtl="0" eaLnBrk="1" latinLnBrk="0" hangingPunct="1">
+              <a:lnSpc>
+                <a:spcPct val="90000"/>
+              </a:lnSpc>
+              <a:spcBef>
+                <a:spcPts val="500"/>
+              </a:spcBef>
+              <a:buFont typeface="Arial" panose="020B0604020202020204" pitchFamily="34" charset="0"/>
+              <a:buChar char="•"/>
+              <a:defRPr sz="1800" kern="1200">
+                <a:solidFill>
+                  <a:schemeClr val="tx1"/>
+                </a:solidFill>
+                <a:latin typeface="+mn-lt"/>
+                <a:ea typeface="+mn-ea"/>
+                <a:cs typeface="+mn-cs"/>
+              </a:defRPr>
+            </a:lvl5pPr>
+            <a:lvl6pPr marL="2514600" indent="-228600" algn="l" defTabSz="914400" rtl="0" eaLnBrk="1" latinLnBrk="0" hangingPunct="1">
+              <a:lnSpc>
+                <a:spcPct val="90000"/>
+              </a:lnSpc>
+              <a:spcBef>
+                <a:spcPts val="500"/>
+              </a:spcBef>
+              <a:buFont typeface="Arial" panose="020B0604020202020204" pitchFamily="34" charset="0"/>
+              <a:buChar char="•"/>
+              <a:defRPr sz="1800" kern="1200">
+                <a:solidFill>
+                  <a:schemeClr val="tx1"/>
+                </a:solidFill>
+                <a:latin typeface="+mn-lt"/>
+                <a:ea typeface="+mn-ea"/>
+                <a:cs typeface="+mn-cs"/>
+              </a:defRPr>
+            </a:lvl6pPr>
+            <a:lvl7pPr marL="2971800" indent="-228600" algn="l" defTabSz="914400" rtl="0" eaLnBrk="1" latinLnBrk="0" hangingPunct="1">
+              <a:lnSpc>
+                <a:spcPct val="90000"/>
+              </a:lnSpc>
+              <a:spcBef>
+                <a:spcPts val="500"/>
+              </a:spcBef>
+              <a:buFont typeface="Arial" panose="020B0604020202020204" pitchFamily="34" charset="0"/>
+              <a:buChar char="•"/>
+              <a:defRPr sz="1800" kern="1200">
+                <a:solidFill>
+                  <a:schemeClr val="tx1"/>
+                </a:solidFill>
+                <a:latin typeface="+mn-lt"/>
+                <a:ea typeface="+mn-ea"/>
+                <a:cs typeface="+mn-cs"/>
+              </a:defRPr>
+            </a:lvl7pPr>
+            <a:lvl8pPr marL="3429000" indent="-228600" algn="l" defTabSz="914400" rtl="0" eaLnBrk="1" latinLnBrk="0" hangingPunct="1">
+              <a:lnSpc>
+                <a:spcPct val="90000"/>
+              </a:lnSpc>
+              <a:spcBef>
+                <a:spcPts val="500"/>
+              </a:spcBef>
+              <a:buFont typeface="Arial" panose="020B0604020202020204" pitchFamily="34" charset="0"/>
+              <a:buChar char="•"/>
+              <a:defRPr sz="1800" kern="1200">
+                <a:solidFill>
+                  <a:schemeClr val="tx1"/>
+                </a:solidFill>
+                <a:latin typeface="+mn-lt"/>
+                <a:ea typeface="+mn-ea"/>
+                <a:cs typeface="+mn-cs"/>
+              </a:defRPr>
+            </a:lvl8pPr>
+            <a:lvl9pPr marL="3886200" indent="-228600" algn="l" defTabSz="914400" rtl="0" eaLnBrk="1" latinLnBrk="0" hangingPunct="1">
+              <a:lnSpc>
+                <a:spcPct val="90000"/>
+              </a:lnSpc>
+              <a:spcBef>
+                <a:spcPts val="500"/>
+              </a:spcBef>
+              <a:buFont typeface="Arial" panose="020B0604020202020204" pitchFamily="34" charset="0"/>
+              <a:buChar char="•"/>
+              <a:defRPr sz="1800" kern="1200">
+                <a:solidFill>
+                  <a:schemeClr val="tx1"/>
+                </a:solidFill>
+                <a:latin typeface="+mn-lt"/>
+                <a:ea typeface="+mn-ea"/>
+                <a:cs typeface="+mn-cs"/>
+              </a:defRPr>
+            </a:lvl9pPr>
+          </a:lstStyle>
+          <a:p>
+            <a:pPr>
+              <a:lnSpc>
+                <a:spcPct val="100000"/>
+              </a:lnSpc>
+            </a:pPr>
+            <a:endParaRPr lang="en-US" sz="1000" dirty="0">
+              <a:latin typeface="Helvetica" pitchFamily="2" charset="0"/>
+              <a:cs typeface="Calibri"/>
+            </a:endParaRPr>
+          </a:p>
+        </p:txBody>
+      </p:sp>
+      <p:sp>
+        <p:nvSpPr>
+          <p:cNvPr id="8" name="Content Placeholder 7">
+            <a:extLst>
+              <a:ext uri="{FF2B5EF4-FFF2-40B4-BE49-F238E27FC236}">
+                <a16:creationId xmlns:a16="http://schemas.microsoft.com/office/drawing/2014/main" id="{AC583E2D-9E5D-AF4E-8A3C-43004D01DFBC}"/>
+              </a:ext>
+            </a:extLst>
+          </p:cNvPr>
+          <p:cNvSpPr>
+            <a:spLocks noGrp="1"/>
+          </p:cNvSpPr>
+          <p:nvPr>
+            <p:ph sz="half" idx="1"/>
+          </p:nvPr>
+        </p:nvSpPr>
+        <p:spPr>
+          <a:xfrm>
+            <a:off x="323528" y="2101998"/>
+            <a:ext cx="7759774" cy="4351338"/>
+          </a:xfrm>
+        </p:spPr>
+        <p:txBody>
+          <a:bodyPr>
+            <a:normAutofit/>
+          </a:bodyPr>
+          <a:lstStyle/>
+          <a:p>
+            <a:pPr>
+              <a:lnSpc>
+                <a:spcPct val="150000"/>
+              </a:lnSpc>
+            </a:pPr>
+            <a:r>
+              <a:rPr lang="en-CA" sz="2200" b="1" dirty="0"/>
+              <a:t>How to run Python</a:t>
+            </a:r>
+          </a:p>
+          <a:p>
+            <a:pPr marL="457200" indent="-457200">
+              <a:lnSpc>
+                <a:spcPct val="150000"/>
+              </a:lnSpc>
+              <a:buFont typeface="+mj-lt"/>
+              <a:buAutoNum type="arabicPeriod"/>
+            </a:pPr>
+            <a:r>
+              <a:rPr lang="en-CA" sz="2200" b="1" dirty="0"/>
+              <a:t>Easiest way is to install anaconda/</a:t>
+            </a:r>
+            <a:r>
+              <a:rPr lang="en-CA" sz="2200" b="1" dirty="0" err="1"/>
+              <a:t>conda</a:t>
+            </a:r>
+            <a:endParaRPr lang="en-CA" sz="2200" b="1" dirty="0"/>
+          </a:p>
+          <a:p>
+            <a:pPr marL="457200" indent="-457200">
+              <a:lnSpc>
+                <a:spcPct val="150000"/>
+              </a:lnSpc>
+              <a:buFont typeface="+mj-lt"/>
+              <a:buAutoNum type="arabicPeriod"/>
+            </a:pPr>
+            <a:r>
+              <a:rPr lang="en-CA" sz="2200" b="1" dirty="0"/>
+              <a:t>Today we’re using Google </a:t>
+            </a:r>
+            <a:r>
+              <a:rPr lang="en-CA" sz="2200" b="1" dirty="0" err="1"/>
+              <a:t>Colab</a:t>
+            </a:r>
+            <a:r>
+              <a:rPr lang="en-CA" sz="2200" b="1" dirty="0"/>
+              <a:t> notebooks</a:t>
+            </a:r>
+          </a:p>
+          <a:p>
+            <a:pPr marL="457200" indent="-457200">
+              <a:lnSpc>
+                <a:spcPct val="150000"/>
+              </a:lnSpc>
+              <a:buFont typeface="+mj-lt"/>
+              <a:buAutoNum type="arabicPeriod"/>
+            </a:pPr>
+            <a:r>
+              <a:rPr lang="en-CA" sz="2200" b="1" dirty="0" err="1"/>
+              <a:t>Jupyter</a:t>
+            </a:r>
+            <a:r>
+              <a:rPr lang="en-CA" sz="2200" b="1" dirty="0"/>
+              <a:t> notebooks are another good option</a:t>
+            </a:r>
+          </a:p>
+          <a:p>
+            <a:pPr marL="0" indent="0">
+              <a:lnSpc>
+                <a:spcPct val="150000"/>
+              </a:lnSpc>
+              <a:buNone/>
+            </a:pPr>
+            <a:endParaRPr lang="en-CA" sz="2200" b="1" dirty="0"/>
+          </a:p>
+          <a:p>
+            <a:endParaRPr lang="en-CA" b="1" dirty="0"/>
+          </a:p>
+        </p:txBody>
+      </p:sp>
+    </p:spTree>
+    <p:extLst>
+      <p:ext uri="{BB962C8B-B14F-4D97-AF65-F5344CB8AC3E}">
+        <p14:creationId xmlns:p14="http://schemas.microsoft.com/office/powerpoint/2010/main" val="1155186274"/>
+      </p:ext>
+    </p:extLst>
+  </p:cSld>
+  <p:clrMapOvr>
+    <a:masterClrMapping/>
+  </p:clrMapOvr>
+</p:sld>
+</file>
+
+<file path=ppt/slides/slide16.xml><?xml version="1.0" encoding="utf-8"?>
+<p:sld xmlns:a="http://schemas.openxmlformats.org/drawingml/2006/main" xmlns:r="http://schemas.openxmlformats.org/officeDocument/2006/relationships" xmlns:p="http://schemas.openxmlformats.org/presentationml/2006/main">
+  <p:cSld>
+    <p:spTree>
+      <p:nvGrpSpPr>
+        <p:cNvPr id="1" name=""/>
+        <p:cNvGrpSpPr/>
+        <p:nvPr/>
+      </p:nvGrpSpPr>
+      <p:grpSpPr>
+        <a:xfrm>
+          <a:off x="0" y="0"/>
+          <a:ext cx="0" cy="0"/>
+          <a:chOff x="0" y="0"/>
+          <a:chExt cx="0" cy="0"/>
+        </a:xfrm>
+      </p:grpSpPr>
+      <p:sp>
+        <p:nvSpPr>
           <p:cNvPr id="2" name="Title 1">
             <a:extLst>
               <a:ext uri="{FF2B5EF4-FFF2-40B4-BE49-F238E27FC236}">
@@ -8190,7 +8941,7 @@
 </p:sld>
 </file>
 
-<file path=ppt/slides/slide15.xml><?xml version="1.0" encoding="utf-8"?>
+<file path=ppt/slides/slide17.xml><?xml version="1.0" encoding="utf-8"?>
 <p:sld xmlns:a="http://schemas.openxmlformats.org/drawingml/2006/main" xmlns:r="http://schemas.openxmlformats.org/officeDocument/2006/relationships" xmlns:p="http://schemas.openxmlformats.org/presentationml/2006/main">
   <p:cSld>
     <p:spTree>
@@ -8918,7 +9669,7 @@
 </p:sld>
 </file>
 
-<file path=ppt/slides/slide16.xml><?xml version="1.0" encoding="utf-8"?>
+<file path=ppt/slides/slide18.xml><?xml version="1.0" encoding="utf-8"?>
 <p:sld xmlns:a="http://schemas.openxmlformats.org/drawingml/2006/main" xmlns:r="http://schemas.openxmlformats.org/officeDocument/2006/relationships" xmlns:p="http://schemas.openxmlformats.org/presentationml/2006/main">
   <p:cSld>
     <p:spTree>
@@ -10151,7 +10902,7 @@
 </p:sld>
 </file>
 
-<file path=ppt/slides/slide17.xml><?xml version="1.0" encoding="utf-8"?>
+<file path=ppt/slides/slide19.xml><?xml version="1.0" encoding="utf-8"?>
 <p:sld xmlns:a="http://schemas.openxmlformats.org/drawingml/2006/main" xmlns:r="http://schemas.openxmlformats.org/officeDocument/2006/relationships" xmlns:p="http://schemas.openxmlformats.org/presentationml/2006/main">
   <p:cSld>
     <p:spTree>
@@ -11120,7 +11871,37 @@
 </p:sld>
 </file>
 
-<file path=ppt/slides/slide18.xml><?xml version="1.0" encoding="utf-8"?>
+<file path=ppt/slides/slide2.xml><?xml version="1.0" encoding="utf-8"?>
+<p:sld xmlns:a="http://schemas.openxmlformats.org/drawingml/2006/main" xmlns:r="http://schemas.openxmlformats.org/officeDocument/2006/relationships" xmlns:p="http://schemas.openxmlformats.org/presentationml/2006/main">
+  <p:cSld>
+    <p:spTree>
+      <p:nvGrpSpPr>
+        <p:cNvPr id="1" name=""/>
+        <p:cNvGrpSpPr/>
+        <p:nvPr/>
+      </p:nvGrpSpPr>
+      <p:grpSpPr>
+        <a:xfrm>
+          <a:off x="0" y="0"/>
+          <a:ext cx="0" cy="0"/>
+          <a:chOff x="0" y="0"/>
+          <a:chExt cx="0" cy="0"/>
+        </a:xfrm>
+      </p:grpSpPr>
+    </p:spTree>
+    <p:extLst>
+      <p:ext uri="{BB962C8B-B14F-4D97-AF65-F5344CB8AC3E}">
+        <p14:creationId xmlns:p14="http://schemas.microsoft.com/office/powerpoint/2010/main" val="3133242724"/>
+      </p:ext>
+    </p:extLst>
+  </p:cSld>
+  <p:clrMapOvr>
+    <a:masterClrMapping/>
+  </p:clrMapOvr>
+</p:sld>
+</file>
+
+<file path=ppt/slides/slide20.xml><?xml version="1.0" encoding="utf-8"?>
 <p:sld xmlns:a="http://schemas.openxmlformats.org/drawingml/2006/main" xmlns:r="http://schemas.openxmlformats.org/officeDocument/2006/relationships" xmlns:p="http://schemas.openxmlformats.org/presentationml/2006/main">
   <p:cSld>
     <p:spTree>
@@ -11364,7 +12145,7 @@
 </p:sld>
 </file>
 
-<file path=ppt/slides/slide19.xml><?xml version="1.0" encoding="utf-8"?>
+<file path=ppt/slides/slide21.xml><?xml version="1.0" encoding="utf-8"?>
 <p:sld xmlns:a="http://schemas.openxmlformats.org/drawingml/2006/main" xmlns:r="http://schemas.openxmlformats.org/officeDocument/2006/relationships" xmlns:p="http://schemas.openxmlformats.org/presentationml/2006/main">
   <p:cSld>
     <p:spTree>
@@ -11535,37 +12316,7 @@
 </p:sld>
 </file>
 
-<file path=ppt/slides/slide2.xml><?xml version="1.0" encoding="utf-8"?>
-<p:sld xmlns:a="http://schemas.openxmlformats.org/drawingml/2006/main" xmlns:r="http://schemas.openxmlformats.org/officeDocument/2006/relationships" xmlns:p="http://schemas.openxmlformats.org/presentationml/2006/main">
-  <p:cSld>
-    <p:spTree>
-      <p:nvGrpSpPr>
-        <p:cNvPr id="1" name=""/>
-        <p:cNvGrpSpPr/>
-        <p:nvPr/>
-      </p:nvGrpSpPr>
-      <p:grpSpPr>
-        <a:xfrm>
-          <a:off x="0" y="0"/>
-          <a:ext cx="0" cy="0"/>
-          <a:chOff x="0" y="0"/>
-          <a:chExt cx="0" cy="0"/>
-        </a:xfrm>
-      </p:grpSpPr>
-    </p:spTree>
-    <p:extLst>
-      <p:ext uri="{BB962C8B-B14F-4D97-AF65-F5344CB8AC3E}">
-        <p14:creationId xmlns:p14="http://schemas.microsoft.com/office/powerpoint/2010/main" val="3133242724"/>
-      </p:ext>
-    </p:extLst>
-  </p:cSld>
-  <p:clrMapOvr>
-    <a:masterClrMapping/>
-  </p:clrMapOvr>
-</p:sld>
-</file>
-
-<file path=ppt/slides/slide20.xml><?xml version="1.0" encoding="utf-8"?>
+<file path=ppt/slides/slide22.xml><?xml version="1.0" encoding="utf-8"?>
 <p:sld xmlns:a="http://schemas.openxmlformats.org/drawingml/2006/main" xmlns:r="http://schemas.openxmlformats.org/officeDocument/2006/relationships" xmlns:p="http://schemas.openxmlformats.org/presentationml/2006/main">
   <p:cSld>
     <p:spTree>
@@ -11726,7 +12477,7 @@
 </p:sld>
 </file>
 
-<file path=ppt/slides/slide21.xml><?xml version="1.0" encoding="utf-8"?>
+<file path=ppt/slides/slide23.xml><?xml version="1.0" encoding="utf-8"?>
 <p:sld xmlns:a="http://schemas.openxmlformats.org/drawingml/2006/main" xmlns:r="http://schemas.openxmlformats.org/officeDocument/2006/relationships" xmlns:p="http://schemas.openxmlformats.org/presentationml/2006/main">
   <p:cSld>
     <p:spTree>
@@ -12034,7 +12785,7 @@
 </p:sld>
 </file>
 
-<file path=ppt/slides/slide22.xml><?xml version="1.0" encoding="utf-8"?>
+<file path=ppt/slides/slide24.xml><?xml version="1.0" encoding="utf-8"?>
 <p:sld xmlns:a="http://schemas.openxmlformats.org/drawingml/2006/main" xmlns:r="http://schemas.openxmlformats.org/officeDocument/2006/relationships" xmlns:p="http://schemas.openxmlformats.org/presentationml/2006/main">
   <p:cSld>
     <p:spTree>
@@ -12204,7 +12955,7 @@
 </p:sld>
 </file>
 
-<file path=ppt/slides/slide23.xml><?xml version="1.0" encoding="utf-8"?>
+<file path=ppt/slides/slide25.xml><?xml version="1.0" encoding="utf-8"?>
 <p:sld xmlns:a="http://schemas.openxmlformats.org/drawingml/2006/main" xmlns:r="http://schemas.openxmlformats.org/officeDocument/2006/relationships" xmlns:p="http://schemas.openxmlformats.org/presentationml/2006/main">
   <p:cSld>
     <p:spTree>
@@ -12353,7 +13104,7 @@
 </p:sld>
 </file>
 
-<file path=ppt/slides/slide24.xml><?xml version="1.0" encoding="utf-8"?>
+<file path=ppt/slides/slide26.xml><?xml version="1.0" encoding="utf-8"?>
 <p:sld xmlns:a="http://schemas.openxmlformats.org/drawingml/2006/main" xmlns:r="http://schemas.openxmlformats.org/officeDocument/2006/relationships" xmlns:p="http://schemas.openxmlformats.org/presentationml/2006/main">
   <p:cSld>
     <p:spTree>

</xml_diff>